<commit_message>
Update presentation with hex code
</commit_message>
<xml_diff>
--- a/MIPS 3_Pres.pptx
+++ b/MIPS 3_Pres.pptx
@@ -10,8 +10,9 @@
     <p:sldId id="258" r:id="rId4"/>
     <p:sldId id="262" r:id="rId5"/>
     <p:sldId id="259" r:id="rId6"/>
-    <p:sldId id="260" r:id="rId7"/>
-    <p:sldId id="261" r:id="rId8"/>
+    <p:sldId id="263" r:id="rId7"/>
+    <p:sldId id="260" r:id="rId8"/>
+    <p:sldId id="261" r:id="rId9"/>
   </p:sldIdLst>
   <p:sldSz cx="12192000" cy="6858000"/>
   <p:notesSz cx="6858000" cy="9144000"/>
@@ -289,7 +290,7 @@
           <a:p>
             <a:fld id="{BFE55775-4320-46C9-ACDA-4AE5C3BD656E}" type="datetimeFigureOut">
               <a:rPr lang="en-US" smtClean="0"/>
-              <a:t>3/5/2019</a:t>
+              <a:t>3/6/2019</a:t>
             </a:fld>
             <a:endParaRPr lang="en-US"/>
           </a:p>
@@ -601,7 +602,7 @@
           <a:p>
             <a:fld id="{BFE55775-4320-46C9-ACDA-4AE5C3BD656E}" type="datetimeFigureOut">
               <a:rPr lang="en-US" smtClean="0"/>
-              <a:t>3/5/2019</a:t>
+              <a:t>3/6/2019</a:t>
             </a:fld>
             <a:endParaRPr lang="en-US"/>
           </a:p>
@@ -823,7 +824,7 @@
           <a:p>
             <a:fld id="{BFE55775-4320-46C9-ACDA-4AE5C3BD656E}" type="datetimeFigureOut">
               <a:rPr lang="en-US" smtClean="0"/>
-              <a:t>3/5/2019</a:t>
+              <a:t>3/6/2019</a:t>
             </a:fld>
             <a:endParaRPr lang="en-US"/>
           </a:p>
@@ -1114,7 +1115,7 @@
           <a:p>
             <a:fld id="{BFE55775-4320-46C9-ACDA-4AE5C3BD656E}" type="datetimeFigureOut">
               <a:rPr lang="en-US" smtClean="0"/>
-              <a:t>3/5/2019</a:t>
+              <a:t>3/6/2019</a:t>
             </a:fld>
             <a:endParaRPr lang="en-US"/>
           </a:p>
@@ -1568,7 +1569,7 @@
           <a:p>
             <a:fld id="{BFE55775-4320-46C9-ACDA-4AE5C3BD656E}" type="datetimeFigureOut">
               <a:rPr lang="en-US" smtClean="0"/>
-              <a:t>3/5/2019</a:t>
+              <a:t>3/6/2019</a:t>
             </a:fld>
             <a:endParaRPr lang="en-US"/>
           </a:p>
@@ -2144,7 +2145,7 @@
           <a:p>
             <a:fld id="{BFE55775-4320-46C9-ACDA-4AE5C3BD656E}" type="datetimeFigureOut">
               <a:rPr lang="en-US" smtClean="0"/>
-              <a:t>3/5/2019</a:t>
+              <a:t>3/6/2019</a:t>
             </a:fld>
             <a:endParaRPr lang="en-US"/>
           </a:p>
@@ -2996,7 +2997,7 @@
           <a:p>
             <a:fld id="{BFE55775-4320-46C9-ACDA-4AE5C3BD656E}" type="datetimeFigureOut">
               <a:rPr lang="en-US" smtClean="0"/>
-              <a:t>3/5/2019</a:t>
+              <a:t>3/6/2019</a:t>
             </a:fld>
             <a:endParaRPr lang="en-US"/>
           </a:p>
@@ -3201,7 +3202,7 @@
           <a:p>
             <a:fld id="{BFE55775-4320-46C9-ACDA-4AE5C3BD656E}" type="datetimeFigureOut">
               <a:rPr lang="en-US" smtClean="0"/>
-              <a:t>3/5/2019</a:t>
+              <a:t>3/6/2019</a:t>
             </a:fld>
             <a:endParaRPr lang="en-US"/>
           </a:p>
@@ -3415,7 +3416,7 @@
           <a:p>
             <a:fld id="{BFE55775-4320-46C9-ACDA-4AE5C3BD656E}" type="datetimeFigureOut">
               <a:rPr lang="en-US" smtClean="0"/>
-              <a:t>3/5/2019</a:t>
+              <a:t>3/6/2019</a:t>
             </a:fld>
             <a:endParaRPr lang="en-US"/>
           </a:p>
@@ -3620,7 +3621,7 @@
           <a:p>
             <a:fld id="{BFE55775-4320-46C9-ACDA-4AE5C3BD656E}" type="datetimeFigureOut">
               <a:rPr lang="en-US" smtClean="0"/>
-              <a:t>3/5/2019</a:t>
+              <a:t>3/6/2019</a:t>
             </a:fld>
             <a:endParaRPr lang="en-US"/>
           </a:p>
@@ -3900,7 +3901,7 @@
           <a:p>
             <a:fld id="{BFE55775-4320-46C9-ACDA-4AE5C3BD656E}" type="datetimeFigureOut">
               <a:rPr lang="en-US" smtClean="0"/>
-              <a:t>3/5/2019</a:t>
+              <a:t>3/6/2019</a:t>
             </a:fld>
             <a:endParaRPr lang="en-US"/>
           </a:p>
@@ -4167,7 +4168,7 @@
           <a:p>
             <a:fld id="{BFE55775-4320-46C9-ACDA-4AE5C3BD656E}" type="datetimeFigureOut">
               <a:rPr lang="en-US" smtClean="0"/>
-              <a:t>3/5/2019</a:t>
+              <a:t>3/6/2019</a:t>
             </a:fld>
             <a:endParaRPr lang="en-US"/>
           </a:p>
@@ -4582,7 +4583,7 @@
           <a:p>
             <a:fld id="{BFE55775-4320-46C9-ACDA-4AE5C3BD656E}" type="datetimeFigureOut">
               <a:rPr lang="en-US" smtClean="0"/>
-              <a:t>3/5/2019</a:t>
+              <a:t>3/6/2019</a:t>
             </a:fld>
             <a:endParaRPr lang="en-US"/>
           </a:p>
@@ -4730,7 +4731,7 @@
           <a:p>
             <a:fld id="{BFE55775-4320-46C9-ACDA-4AE5C3BD656E}" type="datetimeFigureOut">
               <a:rPr lang="en-US" smtClean="0"/>
-              <a:t>3/5/2019</a:t>
+              <a:t>3/6/2019</a:t>
             </a:fld>
             <a:endParaRPr lang="en-US"/>
           </a:p>
@@ -4855,7 +4856,7 @@
           <a:p>
             <a:fld id="{BFE55775-4320-46C9-ACDA-4AE5C3BD656E}" type="datetimeFigureOut">
               <a:rPr lang="en-US" smtClean="0"/>
-              <a:t>3/5/2019</a:t>
+              <a:t>3/6/2019</a:t>
             </a:fld>
             <a:endParaRPr lang="en-US"/>
           </a:p>
@@ -5134,7 +5135,7 @@
           <a:p>
             <a:fld id="{BFE55775-4320-46C9-ACDA-4AE5C3BD656E}" type="datetimeFigureOut">
               <a:rPr lang="en-US" smtClean="0"/>
-              <a:t>3/5/2019</a:t>
+              <a:t>3/6/2019</a:t>
             </a:fld>
             <a:endParaRPr lang="en-US"/>
           </a:p>
@@ -5446,7 +5447,7 @@
           <a:p>
             <a:fld id="{BFE55775-4320-46C9-ACDA-4AE5C3BD656E}" type="datetimeFigureOut">
               <a:rPr lang="en-US" smtClean="0"/>
-              <a:t>3/5/2019</a:t>
+              <a:t>3/6/2019</a:t>
             </a:fld>
             <a:endParaRPr lang="en-US"/>
           </a:p>
@@ -5699,7 +5700,7 @@
           <a:p>
             <a:fld id="{BFE55775-4320-46C9-ACDA-4AE5C3BD656E}" type="datetimeFigureOut">
               <a:rPr lang="en-US" smtClean="0"/>
-              <a:t>3/5/2019</a:t>
+              <a:t>3/6/2019</a:t>
             </a:fld>
             <a:endParaRPr lang="en-US"/>
           </a:p>
@@ -6488,12 +6489,12 @@
               <a:t> section, </a:t>
             </a:r>
             <a:r>
-              <a:rPr lang="en-US" dirty="0" err="1"/>
-              <a:t>skippingthe</a:t>
+              <a:rPr lang="en-US" dirty="0" smtClean="0"/>
+              <a:t>skipping the </a:t>
             </a:r>
             <a:r>
               <a:rPr lang="en-US" dirty="0"/>
-              <a:t> jump to end</a:t>
+              <a:t>jump to end</a:t>
             </a:r>
           </a:p>
           <a:p>
@@ -6928,6 +6929,197 @@
           <a:p>
             <a:r>
               <a:rPr lang="en-US" dirty="0" smtClean="0"/>
+              <a:t>Hex instructions</a:t>
+            </a:r>
+            <a:endParaRPr lang="en-US" dirty="0"/>
+          </a:p>
+        </p:txBody>
+      </p:sp>
+      <p:sp>
+        <p:nvSpPr>
+          <p:cNvPr id="3" name="Content Placeholder 2"/>
+          <p:cNvSpPr>
+            <a:spLocks noGrp="1"/>
+          </p:cNvSpPr>
+          <p:nvPr>
+            <p:ph sz="quarter" idx="13"/>
+          </p:nvPr>
+        </p:nvSpPr>
+        <p:spPr>
+          <a:xfrm>
+            <a:off x="913774" y="1862052"/>
+            <a:ext cx="10363826" cy="3929148"/>
+          </a:xfrm>
+        </p:spPr>
+        <p:txBody>
+          <a:bodyPr>
+            <a:normAutofit/>
+          </a:bodyPr>
+          <a:lstStyle/>
+          <a:p>
+            <a:pPr marL="0" indent="0">
+              <a:buNone/>
+            </a:pPr>
+            <a:r>
+              <a:rPr lang="en-US" dirty="0" smtClean="0"/>
+              <a:t>20040001		# </a:t>
+            </a:r>
+            <a:r>
+              <a:rPr lang="en-US" dirty="0" err="1" smtClean="0"/>
+              <a:t>addi</a:t>
+            </a:r>
+            <a:r>
+              <a:rPr lang="en-US" dirty="0" smtClean="0"/>
+              <a:t> </a:t>
+            </a:r>
+            <a:endParaRPr lang="en-US" dirty="0"/>
+          </a:p>
+          <a:p>
+            <a:pPr marL="0" indent="0">
+              <a:buNone/>
+            </a:pPr>
+            <a:r>
+              <a:rPr lang="en-US" dirty="0" smtClean="0"/>
+              <a:t>20050001		# </a:t>
+            </a:r>
+            <a:r>
+              <a:rPr lang="en-US" dirty="0" err="1" smtClean="0"/>
+              <a:t>addi</a:t>
+            </a:r>
+            <a:r>
+              <a:rPr lang="en-US" dirty="0" smtClean="0"/>
+              <a:t> – Registers are equal</a:t>
+            </a:r>
+            <a:endParaRPr lang="en-US" dirty="0"/>
+          </a:p>
+          <a:p>
+            <a:pPr marL="0" indent="0">
+              <a:buNone/>
+            </a:pPr>
+            <a:r>
+              <a:rPr lang="en-US" dirty="0" smtClean="0"/>
+              <a:t>14850005		# </a:t>
+            </a:r>
+            <a:r>
+              <a:rPr lang="en-US" dirty="0" err="1" smtClean="0"/>
+              <a:t>bne</a:t>
+            </a:r>
+            <a:r>
+              <a:rPr lang="en-US" dirty="0" smtClean="0"/>
+              <a:t> – DO not Branch</a:t>
+            </a:r>
+            <a:endParaRPr lang="en-US" dirty="0"/>
+          </a:p>
+          <a:p>
+            <a:pPr marL="0" indent="0">
+              <a:buNone/>
+            </a:pPr>
+            <a:r>
+              <a:rPr lang="en-US" dirty="0" smtClean="0"/>
+              <a:t>20a50001		# </a:t>
+            </a:r>
+            <a:r>
+              <a:rPr lang="en-US" dirty="0" err="1" smtClean="0"/>
+              <a:t>ADDi</a:t>
+            </a:r>
+            <a:r>
+              <a:rPr lang="en-US" dirty="0" smtClean="0"/>
+              <a:t> – Registers not equal</a:t>
+            </a:r>
+            <a:endParaRPr lang="en-US" dirty="0"/>
+          </a:p>
+          <a:p>
+            <a:pPr marL="0" indent="0">
+              <a:buNone/>
+            </a:pPr>
+            <a:r>
+              <a:rPr lang="en-US" dirty="0" smtClean="0"/>
+              <a:t>14850001		# BNE - Branch</a:t>
+            </a:r>
+            <a:endParaRPr lang="en-US" dirty="0"/>
+          </a:p>
+          <a:p>
+            <a:pPr marL="0" indent="0">
+              <a:buNone/>
+            </a:pPr>
+            <a:r>
+              <a:rPr lang="en-US" dirty="0" smtClean="0"/>
+              <a:t>08000008		# Should not execute</a:t>
+            </a:r>
+            <a:endParaRPr lang="en-US" dirty="0"/>
+          </a:p>
+          <a:p>
+            <a:pPr marL="0" indent="0">
+              <a:buNone/>
+            </a:pPr>
+            <a:r>
+              <a:rPr lang="en-US" dirty="0" smtClean="0"/>
+              <a:t>20040003		# ADDI</a:t>
+            </a:r>
+            <a:endParaRPr lang="en-US" dirty="0"/>
+          </a:p>
+          <a:p>
+            <a:pPr marL="0" indent="0">
+              <a:buNone/>
+            </a:pPr>
+            <a:r>
+              <a:rPr lang="en-US" dirty="0" smtClean="0"/>
+              <a:t>38850006		# XORI</a:t>
+            </a:r>
+            <a:endParaRPr lang="en-US" dirty="0"/>
+          </a:p>
+          <a:p>
+            <a:endParaRPr lang="en-US" dirty="0"/>
+          </a:p>
+        </p:txBody>
+      </p:sp>
+    </p:spTree>
+    <p:extLst>
+      <p:ext uri="{BB962C8B-B14F-4D97-AF65-F5344CB8AC3E}">
+        <p14:creationId xmlns:p14="http://schemas.microsoft.com/office/powerpoint/2010/main" val="1964977232"/>
+      </p:ext>
+    </p:extLst>
+  </p:cSld>
+  <p:clrMapOvr>
+    <a:masterClrMapping/>
+  </p:clrMapOvr>
+</p:sld>
+</file>
+
+<file path=ppt/slides/slide7.xml><?xml version="1.0" encoding="utf-8"?>
+<p:sld xmlns:a="http://schemas.openxmlformats.org/drawingml/2006/main" xmlns:r="http://schemas.openxmlformats.org/officeDocument/2006/relationships" xmlns:p="http://schemas.openxmlformats.org/presentationml/2006/main">
+  <p:cSld>
+    <p:spTree>
+      <p:nvGrpSpPr>
+        <p:cNvPr id="1" name=""/>
+        <p:cNvGrpSpPr/>
+        <p:nvPr/>
+      </p:nvGrpSpPr>
+      <p:grpSpPr>
+        <a:xfrm>
+          <a:off x="0" y="0"/>
+          <a:ext cx="0" cy="0"/>
+          <a:chOff x="0" y="0"/>
+          <a:chExt cx="0" cy="0"/>
+        </a:xfrm>
+      </p:grpSpPr>
+      <p:sp>
+        <p:nvSpPr>
+          <p:cNvPr id="2" name="Title 1"/>
+          <p:cNvSpPr>
+            <a:spLocks noGrp="1"/>
+          </p:cNvSpPr>
+          <p:nvPr>
+            <p:ph type="title"/>
+          </p:nvPr>
+        </p:nvSpPr>
+        <p:spPr/>
+        <p:txBody>
+          <a:bodyPr/>
+          <a:lstStyle/>
+          <a:p>
+            <a:r>
+              <a:rPr lang="en-US" dirty="0" smtClean="0"/>
               <a:t>process</a:t>
             </a:r>
             <a:endParaRPr lang="en-US" dirty="0"/>
@@ -7002,7 +7194,7 @@
 </p:sld>
 </file>
 
-<file path=ppt/slides/slide7.xml><?xml version="1.0" encoding="utf-8"?>
+<file path=ppt/slides/slide8.xml><?xml version="1.0" encoding="utf-8"?>
 <p:sld xmlns:a="http://schemas.openxmlformats.org/drawingml/2006/main" xmlns:r="http://schemas.openxmlformats.org/officeDocument/2006/relationships" xmlns:p="http://schemas.openxmlformats.org/presentationml/2006/main">
   <p:cSld>
     <p:spTree>

</xml_diff>